<commit_message>
add week 18 notes
</commit_message>
<xml_diff>
--- a/Weekly/18/Week18.pptx
+++ b/Weekly/18/Week18.pptx
@@ -9,6 +9,8 @@
   </p:notesMasterIdLst>
   <p:sldIdLst>
     <p:sldId id="256" r:id="rId8"/>
+    <p:sldId id="257" r:id="rId9"/>
+    <p:sldId id="258" r:id="rId10"/>
   </p:sldIdLst>
   <p:sldSz cx="13004800" cy="9753600"/>
   <p:notesSz cx="6858000" cy="9144000"/>
@@ -2983,7 +2985,7 @@
       </p:grpSpPr>
       <p:sp>
         <p:nvSpPr>
-          <p:cNvPr id="119" name="Title"/>
+          <p:cNvPr id="119" name="Progress Report"/>
           <p:cNvSpPr/>
           <p:nvPr>
             <p:ph type="ctrTitle"/>
@@ -2999,12 +3001,15 @@
           <a:lstStyle/>
           <a:p>
             <a:pPr/>
+            <a:r>
+              <a:t>Progress Report</a:t>
+            </a:r>
           </a:p>
         </p:txBody>
       </p:sp>
       <p:sp>
         <p:nvSpPr>
-          <p:cNvPr id="120" name="Body"/>
+          <p:cNvPr id="120" name="Week 18 (01/05/2017 - 05/05/2017)"/>
           <p:cNvSpPr/>
           <p:nvPr>
             <p:ph type="subTitle" sz="quarter" idx="1"/>
@@ -3020,6 +3025,229 @@
           <a:lstStyle/>
           <a:p>
             <a:pPr/>
+            <a:r>
+              <a:t>Week 18 (01/05/2017 - 05/05/2017)</a:t>
+            </a:r>
+          </a:p>
+        </p:txBody>
+      </p:sp>
+    </p:spTree>
+  </p:cSld>
+  <p:clrMapOvr>
+    <a:masterClrMapping/>
+  </p:clrMapOvr>
+  <p:transition xmlns:p14="http://schemas.microsoft.com/office/powerpoint/2010/main" spd="med" advClick="1"/>
+</p:sld>
+</file>
+
+<file path=ppt/slides/slide2.xml><?xml version="1.0" encoding="utf-8"?>
+<p:sld xmlns:a="http://schemas.openxmlformats.org/drawingml/2006/main" xmlns:r="http://schemas.openxmlformats.org/officeDocument/2006/relationships" xmlns:p="http://schemas.openxmlformats.org/presentationml/2006/main" showMasterSp="1" showMasterPhAnim="1">
+  <p:cSld>
+    <p:spTree>
+      <p:nvGrpSpPr>
+        <p:cNvPr id="1" name=""/>
+        <p:cNvGrpSpPr/>
+        <p:nvPr/>
+      </p:nvGrpSpPr>
+      <p:grpSpPr>
+        <a:xfrm>
+          <a:off x="0" y="0"/>
+          <a:ext cx="0" cy="0"/>
+          <a:chOff x="0" y="0"/>
+          <a:chExt cx="0" cy="0"/>
+        </a:xfrm>
+      </p:grpSpPr>
+      <p:sp>
+        <p:nvSpPr>
+          <p:cNvPr id="122" name="Week Notes"/>
+          <p:cNvSpPr/>
+          <p:nvPr>
+            <p:ph type="title"/>
+          </p:nvPr>
+        </p:nvSpPr>
+        <p:spPr>
+          <a:prstGeom prst="rect">
+            <a:avLst/>
+          </a:prstGeom>
+        </p:spPr>
+        <p:txBody>
+          <a:bodyPr/>
+          <a:lstStyle/>
+          <a:p>
+            <a:pPr/>
+            <a:r>
+              <a:t>Week Notes</a:t>
+            </a:r>
+          </a:p>
+        </p:txBody>
+      </p:sp>
+      <p:sp>
+        <p:nvSpPr>
+          <p:cNvPr id="123" name="Kingsday &amp; Kingsday +1…"/>
+          <p:cNvSpPr/>
+          <p:nvPr>
+            <p:ph type="body" idx="1"/>
+          </p:nvPr>
+        </p:nvSpPr>
+        <p:spPr>
+          <a:prstGeom prst="rect">
+            <a:avLst/>
+          </a:prstGeom>
+        </p:spPr>
+        <p:txBody>
+          <a:bodyPr/>
+          <a:lstStyle/>
+          <a:p>
+            <a:pPr marL="391159" indent="-391159" defTabSz="514095">
+              <a:spcBef>
+                <a:spcPts val="3600"/>
+              </a:spcBef>
+              <a:defRPr sz="3168"/>
+            </a:pPr>
+            <a:r>
+              <a:t>Kingsday &amp; Kingsday +1</a:t>
+            </a:r>
+          </a:p>
+          <a:p>
+            <a:pPr marL="391159" indent="-391159" defTabSz="514095">
+              <a:spcBef>
+                <a:spcPts val="3600"/>
+              </a:spcBef>
+              <a:defRPr sz="3168"/>
+            </a:pPr>
+            <a:r>
+              <a:t>Started investigating evaluation techniques for algorithms</a:t>
+            </a:r>
+          </a:p>
+          <a:p>
+            <a:pPr lvl="1" marL="782319" indent="-391159" defTabSz="514095">
+              <a:spcBef>
+                <a:spcPts val="3600"/>
+              </a:spcBef>
+              <a:defRPr sz="3168"/>
+            </a:pPr>
+            <a:r>
+              <a:t>Had a look at how some of the papers I found are doing it</a:t>
+            </a:r>
+          </a:p>
+          <a:p>
+            <a:pPr lvl="1" marL="782319" indent="-391159" defTabSz="514095">
+              <a:spcBef>
+                <a:spcPts val="3600"/>
+              </a:spcBef>
+              <a:defRPr sz="3168"/>
+            </a:pPr>
+            <a:r>
+              <a:t>Investigated how these methods may be lacking</a:t>
+            </a:r>
+          </a:p>
+          <a:p>
+            <a:pPr lvl="1" marL="782319" indent="-391159" defTabSz="514095">
+              <a:spcBef>
+                <a:spcPts val="3600"/>
+              </a:spcBef>
+              <a:defRPr sz="3168"/>
+            </a:pPr>
+            <a:r>
+              <a:t>Investigated TREC evaluation methods</a:t>
+            </a:r>
+          </a:p>
+          <a:p>
+            <a:pPr lvl="1" marL="782319" indent="-391159" defTabSz="514095">
+              <a:spcBef>
+                <a:spcPts val="3600"/>
+              </a:spcBef>
+              <a:defRPr sz="3168"/>
+            </a:pPr>
+            <a:r>
+              <a:t>Chose a couple of “ineffective” methods for baseline generation</a:t>
+            </a:r>
+          </a:p>
+        </p:txBody>
+      </p:sp>
+    </p:spTree>
+  </p:cSld>
+  <p:clrMapOvr>
+    <a:masterClrMapping/>
+  </p:clrMapOvr>
+  <p:transition xmlns:p14="http://schemas.microsoft.com/office/powerpoint/2010/main" spd="med" advClick="1"/>
+</p:sld>
+</file>
+
+<file path=ppt/slides/slide3.xml><?xml version="1.0" encoding="utf-8"?>
+<p:sld xmlns:a="http://schemas.openxmlformats.org/drawingml/2006/main" xmlns:r="http://schemas.openxmlformats.org/officeDocument/2006/relationships" xmlns:p="http://schemas.openxmlformats.org/presentationml/2006/main" showMasterSp="1" showMasterPhAnim="1">
+  <p:cSld>
+    <p:spTree>
+      <p:nvGrpSpPr>
+        <p:cNvPr id="1" name=""/>
+        <p:cNvGrpSpPr/>
+        <p:nvPr/>
+      </p:nvGrpSpPr>
+      <p:grpSpPr>
+        <a:xfrm>
+          <a:off x="0" y="0"/>
+          <a:ext cx="0" cy="0"/>
+          <a:chOff x="0" y="0"/>
+          <a:chExt cx="0" cy="0"/>
+        </a:xfrm>
+      </p:grpSpPr>
+      <p:sp>
+        <p:nvSpPr>
+          <p:cNvPr id="125" name="Next Week"/>
+          <p:cNvSpPr/>
+          <p:nvPr>
+            <p:ph type="title"/>
+          </p:nvPr>
+        </p:nvSpPr>
+        <p:spPr>
+          <a:prstGeom prst="rect">
+            <a:avLst/>
+          </a:prstGeom>
+        </p:spPr>
+        <p:txBody>
+          <a:bodyPr/>
+          <a:lstStyle/>
+          <a:p>
+            <a:pPr/>
+            <a:r>
+              <a:t>Next Week</a:t>
+            </a:r>
+          </a:p>
+        </p:txBody>
+      </p:sp>
+      <p:sp>
+        <p:nvSpPr>
+          <p:cNvPr id="126" name="Finalise evaluation pipeline…"/>
+          <p:cNvSpPr/>
+          <p:nvPr>
+            <p:ph type="body" idx="1"/>
+          </p:nvPr>
+        </p:nvSpPr>
+        <p:spPr>
+          <a:prstGeom prst="rect">
+            <a:avLst/>
+          </a:prstGeom>
+        </p:spPr>
+        <p:txBody>
+          <a:bodyPr/>
+          <a:lstStyle/>
+          <a:p>
+            <a:pPr/>
+            <a:r>
+              <a:t>Finalise evaluation pipeline</a:t>
+            </a:r>
+          </a:p>
+          <a:p>
+            <a:pPr/>
+            <a:r>
+              <a:t>Implement 2 baseline methods of change detection</a:t>
+            </a:r>
+          </a:p>
+          <a:p>
+            <a:pPr/>
+            <a:r>
+              <a:t>Investigate other approaches, hunt down a library or some source for these to allow concentrating on evaluation scaffhold</a:t>
+            </a:r>
           </a:p>
         </p:txBody>
       </p:sp>

</xml_diff>